<commit_message>
script of model done
</commit_message>
<xml_diff>
--- a/pictures.pptx
+++ b/pictures.pptx
@@ -7,6 +7,8 @@
   <p:sldIdLst>
     <p:sldId id="256" r:id="rId2"/>
     <p:sldId id="257" r:id="rId3"/>
+    <p:sldId id="258" r:id="rId4"/>
+    <p:sldId id="259" r:id="rId5"/>
   </p:sldIdLst>
   <p:sldSz cx="9144000" cy="6858000" type="screen4x3"/>
   <p:notesSz cx="6858000" cy="9144000"/>
@@ -289,7 +291,7 @@
           <a:p>
             <a:fld id="{3C086A6F-D3DB-744F-A061-85CA69EE4C5F}" type="datetimeFigureOut">
               <a:rPr lang="en-US" smtClean="0"/>
-              <a:t>1/23/18</a:t>
+              <a:t>4/22/18</a:t>
             </a:fld>
             <a:endParaRPr lang="en-US"/>
           </a:p>
@@ -459,7 +461,7 @@
           <a:p>
             <a:fld id="{3C086A6F-D3DB-744F-A061-85CA69EE4C5F}" type="datetimeFigureOut">
               <a:rPr lang="en-US" smtClean="0"/>
-              <a:t>1/23/18</a:t>
+              <a:t>4/22/18</a:t>
             </a:fld>
             <a:endParaRPr lang="en-US"/>
           </a:p>
@@ -639,7 +641,7 @@
           <a:p>
             <a:fld id="{3C086A6F-D3DB-744F-A061-85CA69EE4C5F}" type="datetimeFigureOut">
               <a:rPr lang="en-US" smtClean="0"/>
-              <a:t>1/23/18</a:t>
+              <a:t>4/22/18</a:t>
             </a:fld>
             <a:endParaRPr lang="en-US"/>
           </a:p>
@@ -809,7 +811,7 @@
           <a:p>
             <a:fld id="{3C086A6F-D3DB-744F-A061-85CA69EE4C5F}" type="datetimeFigureOut">
               <a:rPr lang="en-US" smtClean="0"/>
-              <a:t>1/23/18</a:t>
+              <a:t>4/22/18</a:t>
             </a:fld>
             <a:endParaRPr lang="en-US"/>
           </a:p>
@@ -1055,7 +1057,7 @@
           <a:p>
             <a:fld id="{3C086A6F-D3DB-744F-A061-85CA69EE4C5F}" type="datetimeFigureOut">
               <a:rPr lang="en-US" smtClean="0"/>
-              <a:t>1/23/18</a:t>
+              <a:t>4/22/18</a:t>
             </a:fld>
             <a:endParaRPr lang="en-US"/>
           </a:p>
@@ -1343,7 +1345,7 @@
           <a:p>
             <a:fld id="{3C086A6F-D3DB-744F-A061-85CA69EE4C5F}" type="datetimeFigureOut">
               <a:rPr lang="en-US" smtClean="0"/>
-              <a:t>1/23/18</a:t>
+              <a:t>4/22/18</a:t>
             </a:fld>
             <a:endParaRPr lang="en-US"/>
           </a:p>
@@ -1765,7 +1767,7 @@
           <a:p>
             <a:fld id="{3C086A6F-D3DB-744F-A061-85CA69EE4C5F}" type="datetimeFigureOut">
               <a:rPr lang="en-US" smtClean="0"/>
-              <a:t>1/23/18</a:t>
+              <a:t>4/22/18</a:t>
             </a:fld>
             <a:endParaRPr lang="en-US"/>
           </a:p>
@@ -1883,7 +1885,7 @@
           <a:p>
             <a:fld id="{3C086A6F-D3DB-744F-A061-85CA69EE4C5F}" type="datetimeFigureOut">
               <a:rPr lang="en-US" smtClean="0"/>
-              <a:t>1/23/18</a:t>
+              <a:t>4/22/18</a:t>
             </a:fld>
             <a:endParaRPr lang="en-US"/>
           </a:p>
@@ -1978,7 +1980,7 @@
           <a:p>
             <a:fld id="{3C086A6F-D3DB-744F-A061-85CA69EE4C5F}" type="datetimeFigureOut">
               <a:rPr lang="en-US" smtClean="0"/>
-              <a:t>1/23/18</a:t>
+              <a:t>4/22/18</a:t>
             </a:fld>
             <a:endParaRPr lang="en-US"/>
           </a:p>
@@ -2255,7 +2257,7 @@
           <a:p>
             <a:fld id="{3C086A6F-D3DB-744F-A061-85CA69EE4C5F}" type="datetimeFigureOut">
               <a:rPr lang="en-US" smtClean="0"/>
-              <a:t>1/23/18</a:t>
+              <a:t>4/22/18</a:t>
             </a:fld>
             <a:endParaRPr lang="en-US"/>
           </a:p>
@@ -2508,7 +2510,7 @@
           <a:p>
             <a:fld id="{3C086A6F-D3DB-744F-A061-85CA69EE4C5F}" type="datetimeFigureOut">
               <a:rPr lang="en-US" smtClean="0"/>
-              <a:t>1/23/18</a:t>
+              <a:t>4/22/18</a:t>
             </a:fld>
             <a:endParaRPr lang="en-US"/>
           </a:p>
@@ -2721,7 +2723,7 @@
           <a:p>
             <a:fld id="{3C086A6F-D3DB-744F-A061-85CA69EE4C5F}" type="datetimeFigureOut">
               <a:rPr lang="en-US" smtClean="0"/>
-              <a:t>1/23/18</a:t>
+              <a:t>4/22/18</a:t>
             </a:fld>
             <a:endParaRPr lang="en-US"/>
           </a:p>
@@ -3111,7 +3113,11 @@
           <a:bodyPr/>
           <a:lstStyle/>
           <a:p>
-            <a:endParaRPr lang="en-US"/>
+            <a:r>
+              <a:rPr lang="en-US" dirty="0" smtClean="0"/>
+              <a:t>Pictures for workshop paper</a:t>
+            </a:r>
+            <a:endParaRPr lang="en-US" dirty="0"/>
           </a:p>
         </p:txBody>
       </p:sp>
@@ -3318,11 +3324,7 @@
           <a:p>
             <a:r>
               <a:rPr lang="en-US" sz="3200" dirty="0" smtClean="0"/>
-              <a:t>λ = </a:t>
-            </a:r>
-            <a:r>
-              <a:rPr lang="en-US" sz="3200" dirty="0" smtClean="0"/>
-              <a:t>λ</a:t>
+              <a:t>λ = λ</a:t>
             </a:r>
             <a:r>
               <a:rPr lang="en-US" sz="3200" baseline="-25000" dirty="0" smtClean="0"/>
@@ -3607,6 +3609,1177 @@
       </p:par>
     </p:tnLst>
   </p:timing>
+</p:sld>
+</file>
+
+<file path=ppt/slides/slide3.xml><?xml version="1.0" encoding="utf-8"?>
+<p:sld xmlns:a="http://schemas.openxmlformats.org/drawingml/2006/main" xmlns:r="http://schemas.openxmlformats.org/officeDocument/2006/relationships" xmlns:p="http://schemas.openxmlformats.org/presentationml/2006/main">
+  <p:cSld>
+    <p:spTree>
+      <p:nvGrpSpPr>
+        <p:cNvPr id="1" name=""/>
+        <p:cNvGrpSpPr/>
+        <p:nvPr/>
+      </p:nvGrpSpPr>
+      <p:grpSpPr>
+        <a:xfrm>
+          <a:off x="0" y="0"/>
+          <a:ext cx="0" cy="0"/>
+          <a:chOff x="0" y="0"/>
+          <a:chExt cx="0" cy="0"/>
+        </a:xfrm>
+      </p:grpSpPr>
+      <p:sp>
+        <p:nvSpPr>
+          <p:cNvPr id="2" name="Title 1"/>
+          <p:cNvSpPr>
+            <a:spLocks noGrp="1"/>
+          </p:cNvSpPr>
+          <p:nvPr>
+            <p:ph type="title"/>
+          </p:nvPr>
+        </p:nvSpPr>
+        <p:spPr/>
+        <p:txBody>
+          <a:bodyPr>
+            <a:normAutofit/>
+          </a:bodyPr>
+          <a:lstStyle/>
+          <a:p>
+            <a:r>
+              <a:rPr lang="en-US" dirty="0" smtClean="0"/>
+              <a:t>Intro pictures</a:t>
+            </a:r>
+            <a:endParaRPr lang="en-US" dirty="0"/>
+          </a:p>
+        </p:txBody>
+      </p:sp>
+      <p:cxnSp>
+        <p:nvCxnSpPr>
+          <p:cNvPr id="6" name="Straight Arrow Connector 5"/>
+          <p:cNvCxnSpPr/>
+          <p:nvPr/>
+        </p:nvCxnSpPr>
+        <p:spPr>
+          <a:xfrm flipV="1">
+            <a:off x="2009588" y="5632829"/>
+            <a:ext cx="3660588" cy="14942"/>
+          </a:xfrm>
+          <a:prstGeom prst="straightConnector1">
+            <a:avLst/>
+          </a:prstGeom>
+          <a:ln w="3175" cmpd="sng">
+            <a:tailEnd type="arrow"/>
+          </a:ln>
+        </p:spPr>
+        <p:style>
+          <a:lnRef idx="3">
+            <a:schemeClr val="dk1"/>
+          </a:lnRef>
+          <a:fillRef idx="0">
+            <a:schemeClr val="dk1"/>
+          </a:fillRef>
+          <a:effectRef idx="2">
+            <a:schemeClr val="dk1"/>
+          </a:effectRef>
+          <a:fontRef idx="minor">
+            <a:schemeClr val="tx1"/>
+          </a:fontRef>
+        </p:style>
+      </p:cxnSp>
+      <p:cxnSp>
+        <p:nvCxnSpPr>
+          <p:cNvPr id="7" name="Straight Arrow Connector 6"/>
+          <p:cNvCxnSpPr/>
+          <p:nvPr/>
+        </p:nvCxnSpPr>
+        <p:spPr>
+          <a:xfrm flipV="1">
+            <a:off x="2009588" y="3197412"/>
+            <a:ext cx="0" cy="2450359"/>
+          </a:xfrm>
+          <a:prstGeom prst="straightConnector1">
+            <a:avLst/>
+          </a:prstGeom>
+          <a:ln w="3175" cmpd="sng">
+            <a:tailEnd type="arrow"/>
+          </a:ln>
+        </p:spPr>
+        <p:style>
+          <a:lnRef idx="3">
+            <a:schemeClr val="dk1"/>
+          </a:lnRef>
+          <a:fillRef idx="0">
+            <a:schemeClr val="dk1"/>
+          </a:fillRef>
+          <a:effectRef idx="2">
+            <a:schemeClr val="dk1"/>
+          </a:effectRef>
+          <a:fontRef idx="minor">
+            <a:schemeClr val="tx1"/>
+          </a:fontRef>
+        </p:style>
+      </p:cxnSp>
+      <p:cxnSp>
+        <p:nvCxnSpPr>
+          <p:cNvPr id="16" name="Straight Connector 15"/>
+          <p:cNvCxnSpPr/>
+          <p:nvPr/>
+        </p:nvCxnSpPr>
+        <p:spPr>
+          <a:xfrm>
+            <a:off x="2009588" y="4310529"/>
+            <a:ext cx="1038412" cy="0"/>
+          </a:xfrm>
+          <a:prstGeom prst="line">
+            <a:avLst/>
+          </a:prstGeom>
+          <a:ln w="57150" cmpd="sng">
+            <a:prstDash val="solid"/>
+            <a:headEnd type="oval"/>
+            <a:tailEnd type="oval"/>
+          </a:ln>
+        </p:spPr>
+        <p:style>
+          <a:lnRef idx="2">
+            <a:schemeClr val="accent2"/>
+          </a:lnRef>
+          <a:fillRef idx="0">
+            <a:schemeClr val="accent2"/>
+          </a:fillRef>
+          <a:effectRef idx="1">
+            <a:schemeClr val="accent2"/>
+          </a:effectRef>
+          <a:fontRef idx="minor">
+            <a:schemeClr val="tx1"/>
+          </a:fontRef>
+        </p:style>
+      </p:cxnSp>
+      <p:cxnSp>
+        <p:nvCxnSpPr>
+          <p:cNvPr id="19" name="Straight Connector 18"/>
+          <p:cNvCxnSpPr/>
+          <p:nvPr/>
+        </p:nvCxnSpPr>
+        <p:spPr>
+          <a:xfrm>
+            <a:off x="3048000" y="4310529"/>
+            <a:ext cx="1038412" cy="0"/>
+          </a:xfrm>
+          <a:prstGeom prst="line">
+            <a:avLst/>
+          </a:prstGeom>
+          <a:ln w="57150" cmpd="sng">
+            <a:headEnd type="diamond"/>
+            <a:tailEnd type="diamond"/>
+          </a:ln>
+        </p:spPr>
+        <p:style>
+          <a:lnRef idx="2">
+            <a:schemeClr val="accent3"/>
+          </a:lnRef>
+          <a:fillRef idx="0">
+            <a:schemeClr val="accent3"/>
+          </a:fillRef>
+          <a:effectRef idx="1">
+            <a:schemeClr val="accent3"/>
+          </a:effectRef>
+          <a:fontRef idx="minor">
+            <a:schemeClr val="tx1"/>
+          </a:fontRef>
+        </p:style>
+      </p:cxnSp>
+      <p:cxnSp>
+        <p:nvCxnSpPr>
+          <p:cNvPr id="20" name="Straight Connector 19"/>
+          <p:cNvCxnSpPr/>
+          <p:nvPr/>
+        </p:nvCxnSpPr>
+        <p:spPr>
+          <a:xfrm>
+            <a:off x="4086412" y="4310529"/>
+            <a:ext cx="1120588" cy="0"/>
+          </a:xfrm>
+          <a:prstGeom prst="line">
+            <a:avLst/>
+          </a:prstGeom>
+          <a:ln w="57150" cmpd="sng">
+            <a:prstDash val="solid"/>
+            <a:headEnd type="triangle"/>
+            <a:tailEnd type="triangle"/>
+          </a:ln>
+        </p:spPr>
+        <p:style>
+          <a:lnRef idx="2">
+            <a:schemeClr val="accent4"/>
+          </a:lnRef>
+          <a:fillRef idx="0">
+            <a:schemeClr val="accent4"/>
+          </a:fillRef>
+          <a:effectRef idx="1">
+            <a:schemeClr val="accent4"/>
+          </a:effectRef>
+          <a:fontRef idx="minor">
+            <a:schemeClr val="tx1"/>
+          </a:fontRef>
+        </p:style>
+      </p:cxnSp>
+      <p:sp>
+        <p:nvSpPr>
+          <p:cNvPr id="23" name="TextBox 22"/>
+          <p:cNvSpPr txBox="1"/>
+          <p:nvPr/>
+        </p:nvSpPr>
+        <p:spPr>
+          <a:xfrm>
+            <a:off x="5371189" y="5575150"/>
+            <a:ext cx="387446" cy="584776"/>
+          </a:xfrm>
+          <a:prstGeom prst="rect">
+            <a:avLst/>
+          </a:prstGeom>
+          <a:noFill/>
+        </p:spPr>
+        <p:txBody>
+          <a:bodyPr wrap="none" rtlCol="0">
+            <a:spAutoFit/>
+          </a:bodyPr>
+          <a:lstStyle/>
+          <a:p>
+            <a:r>
+              <a:rPr lang="en-US" sz="3200" dirty="0"/>
+              <a:t>λ</a:t>
+            </a:r>
+          </a:p>
+        </p:txBody>
+      </p:sp>
+      <p:sp>
+        <p:nvSpPr>
+          <p:cNvPr id="24" name="TextBox 23"/>
+          <p:cNvSpPr txBox="1"/>
+          <p:nvPr/>
+        </p:nvSpPr>
+        <p:spPr>
+          <a:xfrm>
+            <a:off x="1020372" y="2479201"/>
+            <a:ext cx="917839" cy="1077218"/>
+          </a:xfrm>
+          <a:prstGeom prst="rect">
+            <a:avLst/>
+          </a:prstGeom>
+          <a:noFill/>
+        </p:spPr>
+        <p:txBody>
+          <a:bodyPr wrap="none" rtlCol="0">
+            <a:spAutoFit/>
+          </a:bodyPr>
+          <a:lstStyle/>
+          <a:p>
+            <a:r>
+              <a:rPr lang="en-US" sz="3200" dirty="0" smtClean="0"/>
+              <a:t>VM</a:t>
+            </a:r>
+          </a:p>
+          <a:p>
+            <a:r>
+              <a:rPr lang="en-US" sz="3200" dirty="0" smtClean="0"/>
+              <a:t>Cost</a:t>
+            </a:r>
+            <a:endParaRPr lang="en-US" sz="3200" dirty="0"/>
+          </a:p>
+        </p:txBody>
+      </p:sp>
+      <p:sp>
+        <p:nvSpPr>
+          <p:cNvPr id="25" name="TextBox 24"/>
+          <p:cNvSpPr txBox="1"/>
+          <p:nvPr/>
+        </p:nvSpPr>
+        <p:spPr>
+          <a:xfrm>
+            <a:off x="1407296" y="3965847"/>
+            <a:ext cx="530915" cy="584776"/>
+          </a:xfrm>
+          <a:prstGeom prst="rect">
+            <a:avLst/>
+          </a:prstGeom>
+          <a:noFill/>
+        </p:spPr>
+        <p:txBody>
+          <a:bodyPr wrap="none" rtlCol="0">
+            <a:spAutoFit/>
+          </a:bodyPr>
+          <a:lstStyle/>
+          <a:p>
+            <a:r>
+              <a:rPr lang="en-US" sz="3200" dirty="0" smtClean="0"/>
+              <a:t>C</a:t>
+            </a:r>
+            <a:r>
+              <a:rPr lang="en-US" sz="3200" baseline="-25000" dirty="0" smtClean="0"/>
+              <a:t>v</a:t>
+            </a:r>
+            <a:endParaRPr lang="en-US" sz="3200" dirty="0"/>
+          </a:p>
+        </p:txBody>
+      </p:sp>
+      <p:cxnSp>
+        <p:nvCxnSpPr>
+          <p:cNvPr id="27" name="Straight Connector 26"/>
+          <p:cNvCxnSpPr/>
+          <p:nvPr/>
+        </p:nvCxnSpPr>
+        <p:spPr>
+          <a:xfrm>
+            <a:off x="3048000" y="4310529"/>
+            <a:ext cx="0" cy="1337242"/>
+          </a:xfrm>
+          <a:prstGeom prst="line">
+            <a:avLst/>
+          </a:prstGeom>
+          <a:ln>
+            <a:prstDash val="dot"/>
+          </a:ln>
+        </p:spPr>
+        <p:style>
+          <a:lnRef idx="2">
+            <a:schemeClr val="accent1"/>
+          </a:lnRef>
+          <a:fillRef idx="0">
+            <a:schemeClr val="accent1"/>
+          </a:fillRef>
+          <a:effectRef idx="1">
+            <a:schemeClr val="accent1"/>
+          </a:effectRef>
+          <a:fontRef idx="minor">
+            <a:schemeClr val="tx1"/>
+          </a:fontRef>
+        </p:style>
+      </p:cxnSp>
+      <p:cxnSp>
+        <p:nvCxnSpPr>
+          <p:cNvPr id="28" name="Straight Connector 27"/>
+          <p:cNvCxnSpPr/>
+          <p:nvPr/>
+        </p:nvCxnSpPr>
+        <p:spPr>
+          <a:xfrm>
+            <a:off x="4086412" y="4310529"/>
+            <a:ext cx="0" cy="1337242"/>
+          </a:xfrm>
+          <a:prstGeom prst="line">
+            <a:avLst/>
+          </a:prstGeom>
+          <a:ln>
+            <a:prstDash val="dot"/>
+          </a:ln>
+        </p:spPr>
+        <p:style>
+          <a:lnRef idx="2">
+            <a:schemeClr val="accent1"/>
+          </a:lnRef>
+          <a:fillRef idx="0">
+            <a:schemeClr val="accent1"/>
+          </a:fillRef>
+          <a:effectRef idx="1">
+            <a:schemeClr val="accent1"/>
+          </a:effectRef>
+          <a:fontRef idx="minor">
+            <a:schemeClr val="tx1"/>
+          </a:fontRef>
+        </p:style>
+      </p:cxnSp>
+      <p:sp>
+        <p:nvSpPr>
+          <p:cNvPr id="29" name="TextBox 28"/>
+          <p:cNvSpPr txBox="1"/>
+          <p:nvPr/>
+        </p:nvSpPr>
+        <p:spPr>
+          <a:xfrm>
+            <a:off x="2854277" y="5575150"/>
+            <a:ext cx="426218" cy="461665"/>
+          </a:xfrm>
+          <a:prstGeom prst="rect">
+            <a:avLst/>
+          </a:prstGeom>
+          <a:noFill/>
+        </p:spPr>
+        <p:txBody>
+          <a:bodyPr wrap="none" rtlCol="0">
+            <a:spAutoFit/>
+          </a:bodyPr>
+          <a:lstStyle/>
+          <a:p>
+            <a:r>
+              <a:rPr lang="en-US" sz="2400" dirty="0" smtClean="0"/>
+              <a:t>λ</a:t>
+            </a:r>
+            <a:r>
+              <a:rPr lang="en-US" sz="2400" baseline="-25000" dirty="0" smtClean="0"/>
+              <a:t>L</a:t>
+            </a:r>
+            <a:endParaRPr lang="en-US" sz="2400" dirty="0"/>
+          </a:p>
+        </p:txBody>
+      </p:sp>
+      <p:sp>
+        <p:nvSpPr>
+          <p:cNvPr id="30" name="TextBox 29"/>
+          <p:cNvSpPr txBox="1"/>
+          <p:nvPr/>
+        </p:nvSpPr>
+        <p:spPr>
+          <a:xfrm>
+            <a:off x="3873303" y="5565590"/>
+            <a:ext cx="447759" cy="461665"/>
+          </a:xfrm>
+          <a:prstGeom prst="rect">
+            <a:avLst/>
+          </a:prstGeom>
+          <a:noFill/>
+        </p:spPr>
+        <p:txBody>
+          <a:bodyPr wrap="none" rtlCol="0">
+            <a:spAutoFit/>
+          </a:bodyPr>
+          <a:lstStyle/>
+          <a:p>
+            <a:r>
+              <a:rPr lang="en-US" sz="2400" dirty="0" smtClean="0"/>
+              <a:t>λ</a:t>
+            </a:r>
+            <a:r>
+              <a:rPr lang="en-US" sz="2400" baseline="-25000" dirty="0" smtClean="0"/>
+              <a:t>u</a:t>
+            </a:r>
+            <a:endParaRPr lang="en-US" sz="2400" dirty="0"/>
+          </a:p>
+        </p:txBody>
+      </p:sp>
+      <p:sp>
+        <p:nvSpPr>
+          <p:cNvPr id="31" name="TextBox 30"/>
+          <p:cNvSpPr txBox="1"/>
+          <p:nvPr/>
+        </p:nvSpPr>
+        <p:spPr>
+          <a:xfrm>
+            <a:off x="2005450" y="4459940"/>
+            <a:ext cx="1109790" cy="830997"/>
+          </a:xfrm>
+          <a:prstGeom prst="rect">
+            <a:avLst/>
+          </a:prstGeom>
+          <a:noFill/>
+        </p:spPr>
+        <p:txBody>
+          <a:bodyPr wrap="square" rtlCol="0">
+            <a:spAutoFit/>
+          </a:bodyPr>
+          <a:lstStyle/>
+          <a:p>
+            <a:r>
+              <a:rPr lang="en-US" sz="1600" dirty="0" smtClean="0"/>
+              <a:t>Under-utilized</a:t>
+            </a:r>
+          </a:p>
+          <a:p>
+            <a:r>
+              <a:rPr lang="en-US" sz="1600" dirty="0" smtClean="0"/>
+              <a:t>(high cost)</a:t>
+            </a:r>
+            <a:endParaRPr lang="en-US" sz="1600" dirty="0"/>
+          </a:p>
+        </p:txBody>
+      </p:sp>
+      <p:sp>
+        <p:nvSpPr>
+          <p:cNvPr id="32" name="TextBox 31"/>
+          <p:cNvSpPr txBox="1"/>
+          <p:nvPr/>
+        </p:nvSpPr>
+        <p:spPr>
+          <a:xfrm>
+            <a:off x="4146176" y="4459940"/>
+            <a:ext cx="1374589" cy="830997"/>
+          </a:xfrm>
+          <a:prstGeom prst="rect">
+            <a:avLst/>
+          </a:prstGeom>
+          <a:noFill/>
+        </p:spPr>
+        <p:txBody>
+          <a:bodyPr wrap="square" rtlCol="0">
+            <a:spAutoFit/>
+          </a:bodyPr>
+          <a:lstStyle/>
+          <a:p>
+            <a:r>
+              <a:rPr lang="en-US" sz="1600" dirty="0" smtClean="0"/>
+              <a:t>Over-utilized</a:t>
+            </a:r>
+          </a:p>
+          <a:p>
+            <a:r>
+              <a:rPr lang="en-US" sz="1600" dirty="0" smtClean="0"/>
+              <a:t>(poor performance)</a:t>
+            </a:r>
+            <a:endParaRPr lang="en-US" sz="1600" dirty="0"/>
+          </a:p>
+        </p:txBody>
+      </p:sp>
+    </p:spTree>
+    <p:extLst>
+      <p:ext uri="{BB962C8B-B14F-4D97-AF65-F5344CB8AC3E}">
+        <p14:creationId xmlns:p14="http://schemas.microsoft.com/office/powerpoint/2010/main" val="2110074078"/>
+      </p:ext>
+    </p:extLst>
+  </p:cSld>
+  <p:clrMapOvr>
+    <a:masterClrMapping/>
+  </p:clrMapOvr>
+</p:sld>
+</file>
+
+<file path=ppt/slides/slide4.xml><?xml version="1.0" encoding="utf-8"?>
+<p:sld xmlns:a="http://schemas.openxmlformats.org/drawingml/2006/main" xmlns:r="http://schemas.openxmlformats.org/officeDocument/2006/relationships" xmlns:p="http://schemas.openxmlformats.org/presentationml/2006/main">
+  <p:cSld>
+    <p:spTree>
+      <p:nvGrpSpPr>
+        <p:cNvPr id="1" name=""/>
+        <p:cNvGrpSpPr/>
+        <p:nvPr/>
+      </p:nvGrpSpPr>
+      <p:grpSpPr>
+        <a:xfrm>
+          <a:off x="0" y="0"/>
+          <a:ext cx="0" cy="0"/>
+          <a:chOff x="0" y="0"/>
+          <a:chExt cx="0" cy="0"/>
+        </a:xfrm>
+      </p:grpSpPr>
+      <p:sp>
+        <p:nvSpPr>
+          <p:cNvPr id="2" name="Title 1"/>
+          <p:cNvSpPr>
+            <a:spLocks noGrp="1"/>
+          </p:cNvSpPr>
+          <p:nvPr>
+            <p:ph type="title"/>
+          </p:nvPr>
+        </p:nvSpPr>
+        <p:spPr/>
+        <p:txBody>
+          <a:bodyPr>
+            <a:normAutofit/>
+          </a:bodyPr>
+          <a:lstStyle/>
+          <a:p>
+            <a:r>
+              <a:rPr lang="en-US" dirty="0" smtClean="0"/>
+              <a:t>Intro pictures</a:t>
+            </a:r>
+            <a:endParaRPr lang="en-US" dirty="0"/>
+          </a:p>
+        </p:txBody>
+      </p:sp>
+      <p:cxnSp>
+        <p:nvCxnSpPr>
+          <p:cNvPr id="6" name="Straight Arrow Connector 5"/>
+          <p:cNvCxnSpPr/>
+          <p:nvPr/>
+        </p:nvCxnSpPr>
+        <p:spPr>
+          <a:xfrm flipV="1">
+            <a:off x="2009588" y="5632829"/>
+            <a:ext cx="4459941" cy="14942"/>
+          </a:xfrm>
+          <a:prstGeom prst="straightConnector1">
+            <a:avLst/>
+          </a:prstGeom>
+          <a:ln w="3175" cmpd="sng">
+            <a:tailEnd type="arrow"/>
+          </a:ln>
+        </p:spPr>
+        <p:style>
+          <a:lnRef idx="3">
+            <a:schemeClr val="dk1"/>
+          </a:lnRef>
+          <a:fillRef idx="0">
+            <a:schemeClr val="dk1"/>
+          </a:fillRef>
+          <a:effectRef idx="2">
+            <a:schemeClr val="dk1"/>
+          </a:effectRef>
+          <a:fontRef idx="minor">
+            <a:schemeClr val="tx1"/>
+          </a:fontRef>
+        </p:style>
+      </p:cxnSp>
+      <p:cxnSp>
+        <p:nvCxnSpPr>
+          <p:cNvPr id="7" name="Straight Arrow Connector 6"/>
+          <p:cNvCxnSpPr/>
+          <p:nvPr/>
+        </p:nvCxnSpPr>
+        <p:spPr>
+          <a:xfrm flipV="1">
+            <a:off x="2009588" y="2569882"/>
+            <a:ext cx="0" cy="3077890"/>
+          </a:xfrm>
+          <a:prstGeom prst="straightConnector1">
+            <a:avLst/>
+          </a:prstGeom>
+          <a:ln w="3175" cmpd="sng">
+            <a:tailEnd type="arrow"/>
+          </a:ln>
+        </p:spPr>
+        <p:style>
+          <a:lnRef idx="3">
+            <a:schemeClr val="dk1"/>
+          </a:lnRef>
+          <a:fillRef idx="0">
+            <a:schemeClr val="dk1"/>
+          </a:fillRef>
+          <a:effectRef idx="2">
+            <a:schemeClr val="dk1"/>
+          </a:effectRef>
+          <a:fontRef idx="minor">
+            <a:schemeClr val="tx1"/>
+          </a:fontRef>
+        </p:style>
+      </p:cxnSp>
+      <p:sp>
+        <p:nvSpPr>
+          <p:cNvPr id="23" name="TextBox 22"/>
+          <p:cNvSpPr txBox="1"/>
+          <p:nvPr/>
+        </p:nvSpPr>
+        <p:spPr>
+          <a:xfrm>
+            <a:off x="6409088" y="5565590"/>
+            <a:ext cx="387446" cy="584776"/>
+          </a:xfrm>
+          <a:prstGeom prst="rect">
+            <a:avLst/>
+          </a:prstGeom>
+          <a:noFill/>
+        </p:spPr>
+        <p:txBody>
+          <a:bodyPr wrap="none" rtlCol="0">
+            <a:spAutoFit/>
+          </a:bodyPr>
+          <a:lstStyle/>
+          <a:p>
+            <a:r>
+              <a:rPr lang="en-US" sz="3200" dirty="0"/>
+              <a:t>λ</a:t>
+            </a:r>
+          </a:p>
+        </p:txBody>
+      </p:sp>
+      <p:sp>
+        <p:nvSpPr>
+          <p:cNvPr id="24" name="TextBox 23"/>
+          <p:cNvSpPr txBox="1"/>
+          <p:nvPr/>
+        </p:nvSpPr>
+        <p:spPr>
+          <a:xfrm>
+            <a:off x="1020222" y="1761298"/>
+            <a:ext cx="917839" cy="1077218"/>
+          </a:xfrm>
+          <a:prstGeom prst="rect">
+            <a:avLst/>
+          </a:prstGeom>
+          <a:noFill/>
+        </p:spPr>
+        <p:txBody>
+          <a:bodyPr wrap="none" rtlCol="0">
+            <a:spAutoFit/>
+          </a:bodyPr>
+          <a:lstStyle/>
+          <a:p>
+            <a:r>
+              <a:rPr lang="en-US" sz="3200" dirty="0" smtClean="0"/>
+              <a:t>VM</a:t>
+            </a:r>
+          </a:p>
+          <a:p>
+            <a:r>
+              <a:rPr lang="en-US" sz="3200" dirty="0" smtClean="0"/>
+              <a:t>Cost</a:t>
+            </a:r>
+            <a:endParaRPr lang="en-US" sz="3200" dirty="0"/>
+          </a:p>
+        </p:txBody>
+      </p:sp>
+      <p:sp>
+        <p:nvSpPr>
+          <p:cNvPr id="25" name="TextBox 24"/>
+          <p:cNvSpPr txBox="1"/>
+          <p:nvPr/>
+        </p:nvSpPr>
+        <p:spPr>
+          <a:xfrm>
+            <a:off x="1273489" y="3420464"/>
+            <a:ext cx="736099" cy="584776"/>
+          </a:xfrm>
+          <a:prstGeom prst="rect">
+            <a:avLst/>
+          </a:prstGeom>
+          <a:noFill/>
+        </p:spPr>
+        <p:txBody>
+          <a:bodyPr wrap="none" rtlCol="0">
+            <a:spAutoFit/>
+          </a:bodyPr>
+          <a:lstStyle/>
+          <a:p>
+            <a:r>
+              <a:rPr lang="en-US" sz="3200" dirty="0"/>
+              <a:t>2</a:t>
+            </a:r>
+            <a:r>
+              <a:rPr lang="en-US" sz="3200" dirty="0" smtClean="0"/>
+              <a:t>C</a:t>
+            </a:r>
+            <a:r>
+              <a:rPr lang="en-US" sz="3200" baseline="-25000" dirty="0" smtClean="0"/>
+              <a:t>v</a:t>
+            </a:r>
+            <a:endParaRPr lang="en-US" sz="3200" dirty="0"/>
+          </a:p>
+        </p:txBody>
+      </p:sp>
+      <p:cxnSp>
+        <p:nvCxnSpPr>
+          <p:cNvPr id="27" name="Straight Connector 26"/>
+          <p:cNvCxnSpPr/>
+          <p:nvPr/>
+        </p:nvCxnSpPr>
+        <p:spPr>
+          <a:xfrm>
+            <a:off x="3048000" y="4560017"/>
+            <a:ext cx="0" cy="1087754"/>
+          </a:xfrm>
+          <a:prstGeom prst="line">
+            <a:avLst/>
+          </a:prstGeom>
+          <a:ln>
+            <a:prstDash val="dot"/>
+          </a:ln>
+        </p:spPr>
+        <p:style>
+          <a:lnRef idx="2">
+            <a:schemeClr val="accent1"/>
+          </a:lnRef>
+          <a:fillRef idx="0">
+            <a:schemeClr val="accent1"/>
+          </a:fillRef>
+          <a:effectRef idx="1">
+            <a:schemeClr val="accent1"/>
+          </a:effectRef>
+          <a:fontRef idx="minor">
+            <a:schemeClr val="tx1"/>
+          </a:fontRef>
+        </p:style>
+      </p:cxnSp>
+      <p:cxnSp>
+        <p:nvCxnSpPr>
+          <p:cNvPr id="28" name="Straight Connector 27"/>
+          <p:cNvCxnSpPr/>
+          <p:nvPr/>
+        </p:nvCxnSpPr>
+        <p:spPr>
+          <a:xfrm flipH="1">
+            <a:off x="4086412" y="3765146"/>
+            <a:ext cx="512" cy="1882625"/>
+          </a:xfrm>
+          <a:prstGeom prst="line">
+            <a:avLst/>
+          </a:prstGeom>
+          <a:ln>
+            <a:prstDash val="dot"/>
+          </a:ln>
+        </p:spPr>
+        <p:style>
+          <a:lnRef idx="2">
+            <a:schemeClr val="accent1"/>
+          </a:lnRef>
+          <a:fillRef idx="0">
+            <a:schemeClr val="accent1"/>
+          </a:fillRef>
+          <a:effectRef idx="1">
+            <a:schemeClr val="accent1"/>
+          </a:effectRef>
+          <a:fontRef idx="minor">
+            <a:schemeClr val="tx1"/>
+          </a:fontRef>
+        </p:style>
+      </p:cxnSp>
+      <p:sp>
+        <p:nvSpPr>
+          <p:cNvPr id="29" name="TextBox 28"/>
+          <p:cNvSpPr txBox="1"/>
+          <p:nvPr/>
+        </p:nvSpPr>
+        <p:spPr>
+          <a:xfrm>
+            <a:off x="2854277" y="5575150"/>
+            <a:ext cx="426218" cy="461665"/>
+          </a:xfrm>
+          <a:prstGeom prst="rect">
+            <a:avLst/>
+          </a:prstGeom>
+          <a:noFill/>
+        </p:spPr>
+        <p:txBody>
+          <a:bodyPr wrap="none" rtlCol="0">
+            <a:spAutoFit/>
+          </a:bodyPr>
+          <a:lstStyle/>
+          <a:p>
+            <a:r>
+              <a:rPr lang="en-US" sz="2400" dirty="0" smtClean="0"/>
+              <a:t>λ</a:t>
+            </a:r>
+            <a:r>
+              <a:rPr lang="en-US" sz="2400" baseline="-25000" dirty="0" smtClean="0"/>
+              <a:t>L</a:t>
+            </a:r>
+            <a:endParaRPr lang="en-US" sz="2400" dirty="0"/>
+          </a:p>
+        </p:txBody>
+      </p:sp>
+      <p:sp>
+        <p:nvSpPr>
+          <p:cNvPr id="30" name="TextBox 29"/>
+          <p:cNvSpPr txBox="1"/>
+          <p:nvPr/>
+        </p:nvSpPr>
+        <p:spPr>
+          <a:xfrm>
+            <a:off x="3873303" y="5565590"/>
+            <a:ext cx="447759" cy="461665"/>
+          </a:xfrm>
+          <a:prstGeom prst="rect">
+            <a:avLst/>
+          </a:prstGeom>
+          <a:noFill/>
+        </p:spPr>
+        <p:txBody>
+          <a:bodyPr wrap="none" rtlCol="0">
+            <a:spAutoFit/>
+          </a:bodyPr>
+          <a:lstStyle/>
+          <a:p>
+            <a:r>
+              <a:rPr lang="en-US" sz="2400" dirty="0" smtClean="0"/>
+              <a:t>λ</a:t>
+            </a:r>
+            <a:r>
+              <a:rPr lang="en-US" sz="2400" baseline="-25000" dirty="0" smtClean="0"/>
+              <a:t>u</a:t>
+            </a:r>
+            <a:endParaRPr lang="en-US" sz="2400" dirty="0"/>
+          </a:p>
+        </p:txBody>
+      </p:sp>
+      <p:sp>
+        <p:nvSpPr>
+          <p:cNvPr id="15" name="TextBox 14"/>
+          <p:cNvSpPr txBox="1"/>
+          <p:nvPr/>
+        </p:nvSpPr>
+        <p:spPr>
+          <a:xfrm>
+            <a:off x="1407146" y="4237747"/>
+            <a:ext cx="530915" cy="584776"/>
+          </a:xfrm>
+          <a:prstGeom prst="rect">
+            <a:avLst/>
+          </a:prstGeom>
+          <a:noFill/>
+        </p:spPr>
+        <p:txBody>
+          <a:bodyPr wrap="none" rtlCol="0">
+            <a:spAutoFit/>
+          </a:bodyPr>
+          <a:lstStyle/>
+          <a:p>
+            <a:r>
+              <a:rPr lang="en-US" sz="3200" dirty="0" smtClean="0"/>
+              <a:t>C</a:t>
+            </a:r>
+            <a:r>
+              <a:rPr lang="en-US" sz="3200" baseline="-25000" dirty="0" smtClean="0"/>
+              <a:t>v</a:t>
+            </a:r>
+            <a:endParaRPr lang="en-US" sz="3200" dirty="0"/>
+          </a:p>
+        </p:txBody>
+      </p:sp>
+      <p:cxnSp>
+        <p:nvCxnSpPr>
+          <p:cNvPr id="17" name="Straight Connector 16"/>
+          <p:cNvCxnSpPr/>
+          <p:nvPr/>
+        </p:nvCxnSpPr>
+        <p:spPr>
+          <a:xfrm>
+            <a:off x="2009588" y="4560017"/>
+            <a:ext cx="1038412" cy="0"/>
+          </a:xfrm>
+          <a:prstGeom prst="line">
+            <a:avLst/>
+          </a:prstGeom>
+          <a:ln w="57150" cmpd="sng">
+            <a:prstDash val="solid"/>
+            <a:headEnd type="oval"/>
+            <a:tailEnd type="oval"/>
+          </a:ln>
+        </p:spPr>
+        <p:style>
+          <a:lnRef idx="2">
+            <a:schemeClr val="accent2"/>
+          </a:lnRef>
+          <a:fillRef idx="0">
+            <a:schemeClr val="accent2"/>
+          </a:fillRef>
+          <a:effectRef idx="1">
+            <a:schemeClr val="accent2"/>
+          </a:effectRef>
+          <a:fontRef idx="minor">
+            <a:schemeClr val="tx1"/>
+          </a:fontRef>
+        </p:style>
+      </p:cxnSp>
+      <p:cxnSp>
+        <p:nvCxnSpPr>
+          <p:cNvPr id="18" name="Straight Connector 17"/>
+          <p:cNvCxnSpPr/>
+          <p:nvPr/>
+        </p:nvCxnSpPr>
+        <p:spPr>
+          <a:xfrm>
+            <a:off x="3048000" y="4560017"/>
+            <a:ext cx="1038412" cy="0"/>
+          </a:xfrm>
+          <a:prstGeom prst="line">
+            <a:avLst/>
+          </a:prstGeom>
+          <a:ln w="57150" cmpd="sng">
+            <a:headEnd type="diamond"/>
+            <a:tailEnd type="diamond"/>
+          </a:ln>
+        </p:spPr>
+        <p:style>
+          <a:lnRef idx="2">
+            <a:schemeClr val="accent3"/>
+          </a:lnRef>
+          <a:fillRef idx="0">
+            <a:schemeClr val="accent3"/>
+          </a:fillRef>
+          <a:effectRef idx="1">
+            <a:schemeClr val="accent3"/>
+          </a:effectRef>
+          <a:fontRef idx="minor">
+            <a:schemeClr val="tx1"/>
+          </a:fontRef>
+        </p:style>
+      </p:cxnSp>
+      <p:cxnSp>
+        <p:nvCxnSpPr>
+          <p:cNvPr id="22" name="Straight Connector 21"/>
+          <p:cNvCxnSpPr/>
+          <p:nvPr/>
+        </p:nvCxnSpPr>
+        <p:spPr>
+          <a:xfrm>
+            <a:off x="4086412" y="3765146"/>
+            <a:ext cx="1038412" cy="0"/>
+          </a:xfrm>
+          <a:prstGeom prst="line">
+            <a:avLst/>
+          </a:prstGeom>
+          <a:ln w="57150" cmpd="sng">
+            <a:prstDash val="solid"/>
+            <a:headEnd type="oval"/>
+            <a:tailEnd type="oval"/>
+          </a:ln>
+        </p:spPr>
+        <p:style>
+          <a:lnRef idx="2">
+            <a:schemeClr val="accent2"/>
+          </a:lnRef>
+          <a:fillRef idx="0">
+            <a:schemeClr val="accent2"/>
+          </a:fillRef>
+          <a:effectRef idx="1">
+            <a:schemeClr val="accent2"/>
+          </a:effectRef>
+          <a:fontRef idx="minor">
+            <a:schemeClr val="tx1"/>
+          </a:fontRef>
+        </p:style>
+      </p:cxnSp>
+      <p:cxnSp>
+        <p:nvCxnSpPr>
+          <p:cNvPr id="26" name="Straight Connector 25"/>
+          <p:cNvCxnSpPr/>
+          <p:nvPr/>
+        </p:nvCxnSpPr>
+        <p:spPr>
+          <a:xfrm>
+            <a:off x="5150970" y="3765146"/>
+            <a:ext cx="1038412" cy="0"/>
+          </a:xfrm>
+          <a:prstGeom prst="line">
+            <a:avLst/>
+          </a:prstGeom>
+          <a:ln w="57150" cmpd="sng">
+            <a:headEnd type="diamond"/>
+            <a:tailEnd type="diamond"/>
+          </a:ln>
+        </p:spPr>
+        <p:style>
+          <a:lnRef idx="2">
+            <a:schemeClr val="accent3"/>
+          </a:lnRef>
+          <a:fillRef idx="0">
+            <a:schemeClr val="accent3"/>
+          </a:fillRef>
+          <a:effectRef idx="1">
+            <a:schemeClr val="accent3"/>
+          </a:effectRef>
+          <a:fontRef idx="minor">
+            <a:schemeClr val="tx1"/>
+          </a:fontRef>
+        </p:style>
+      </p:cxnSp>
+      <p:cxnSp>
+        <p:nvCxnSpPr>
+          <p:cNvPr id="31" name="Straight Connector 30"/>
+          <p:cNvCxnSpPr/>
+          <p:nvPr/>
+        </p:nvCxnSpPr>
+        <p:spPr>
+          <a:xfrm>
+            <a:off x="5150970" y="3765146"/>
+            <a:ext cx="2988" cy="1882625"/>
+          </a:xfrm>
+          <a:prstGeom prst="line">
+            <a:avLst/>
+          </a:prstGeom>
+          <a:ln>
+            <a:prstDash val="dot"/>
+          </a:ln>
+        </p:spPr>
+        <p:style>
+          <a:lnRef idx="2">
+            <a:schemeClr val="accent1"/>
+          </a:lnRef>
+          <a:fillRef idx="0">
+            <a:schemeClr val="accent1"/>
+          </a:fillRef>
+          <a:effectRef idx="1">
+            <a:schemeClr val="accent1"/>
+          </a:effectRef>
+          <a:fontRef idx="minor">
+            <a:schemeClr val="tx1"/>
+          </a:fontRef>
+        </p:style>
+      </p:cxnSp>
+      <p:sp>
+        <p:nvSpPr>
+          <p:cNvPr id="32" name="TextBox 31"/>
+          <p:cNvSpPr txBox="1"/>
+          <p:nvPr/>
+        </p:nvSpPr>
+        <p:spPr>
+          <a:xfrm>
+            <a:off x="4839997" y="5576651"/>
+            <a:ext cx="945742" cy="461665"/>
+          </a:xfrm>
+          <a:prstGeom prst="rect">
+            <a:avLst/>
+          </a:prstGeom>
+          <a:noFill/>
+        </p:spPr>
+        <p:txBody>
+          <a:bodyPr wrap="none" rtlCol="0">
+            <a:spAutoFit/>
+          </a:bodyPr>
+          <a:lstStyle/>
+          <a:p>
+            <a:r>
+              <a:rPr lang="en-US" sz="2400" dirty="0" smtClean="0"/>
+              <a:t>λ</a:t>
+            </a:r>
+            <a:r>
+              <a:rPr lang="en-US" sz="2400" baseline="-25000" dirty="0" smtClean="0"/>
+              <a:t>u </a:t>
+            </a:r>
+            <a:r>
+              <a:rPr lang="en-US" sz="2400" dirty="0" smtClean="0"/>
+              <a:t>+ λ</a:t>
+            </a:r>
+            <a:r>
+              <a:rPr lang="en-US" sz="2400" baseline="-25000" dirty="0" smtClean="0"/>
+              <a:t>L</a:t>
+            </a:r>
+            <a:endParaRPr lang="en-US" sz="2400" dirty="0"/>
+          </a:p>
+        </p:txBody>
+      </p:sp>
+      <p:sp>
+        <p:nvSpPr>
+          <p:cNvPr id="33" name="TextBox 32"/>
+          <p:cNvSpPr txBox="1"/>
+          <p:nvPr/>
+        </p:nvSpPr>
+        <p:spPr>
+          <a:xfrm>
+            <a:off x="4161630" y="3898297"/>
+            <a:ext cx="1109790" cy="1323439"/>
+          </a:xfrm>
+          <a:prstGeom prst="rect">
+            <a:avLst/>
+          </a:prstGeom>
+          <a:noFill/>
+        </p:spPr>
+        <p:txBody>
+          <a:bodyPr wrap="square" rtlCol="0">
+            <a:spAutoFit/>
+          </a:bodyPr>
+          <a:lstStyle/>
+          <a:p>
+            <a:r>
+              <a:rPr lang="en-US" sz="2000" dirty="0" smtClean="0"/>
+              <a:t>Under-utilized</a:t>
+            </a:r>
+          </a:p>
+          <a:p>
+            <a:r>
+              <a:rPr lang="en-US" sz="2000" dirty="0" smtClean="0"/>
+              <a:t>(high cost)</a:t>
+            </a:r>
+            <a:endParaRPr lang="en-US" sz="2000" dirty="0"/>
+          </a:p>
+        </p:txBody>
+      </p:sp>
+    </p:spTree>
+    <p:extLst>
+      <p:ext uri="{BB962C8B-B14F-4D97-AF65-F5344CB8AC3E}">
+        <p14:creationId xmlns:p14="http://schemas.microsoft.com/office/powerpoint/2010/main" val="1075539676"/>
+      </p:ext>
+    </p:extLst>
+  </p:cSld>
+  <p:clrMapOvr>
+    <a:masterClrMapping/>
+  </p:clrMapOvr>
 </p:sld>
 </file>
 

</xml_diff>